<commit_message>
Add github link to presentation
</commit_message>
<xml_diff>
--- a/FLT - Kotlin.pptx
+++ b/FLT - Kotlin.pptx
@@ -30,6 +30,7 @@
     <p:sldId id="273" r:id="rId24"/>
     <p:sldId id="274" r:id="rId25"/>
     <p:sldId id="275" r:id="rId26"/>
+    <p:sldId id="281" r:id="rId27"/>
   </p:sldIdLst>
   <p:sldSz cx="9144000" cy="6858000" type="screen4x3"/>
   <p:notesSz cx="6858000" cy="9144000"/>
@@ -313,7 +314,7 @@
             <a:fld id="{73F4CB99-C2FC-42A4-B004-24C52B80AF11}" type="datetimeFigureOut">
               <a:rPr lang="de-DE" smtClean="0"/>
               <a:pPr/>
-              <a:t>25.04.2016</a:t>
+              <a:t>02.05.2016</a:t>
             </a:fld>
             <a:endParaRPr lang="de-DE"/>
           </a:p>
@@ -480,7 +481,7 @@
             <a:fld id="{73F4CB99-C2FC-42A4-B004-24C52B80AF11}" type="datetimeFigureOut">
               <a:rPr lang="de-DE" smtClean="0"/>
               <a:pPr/>
-              <a:t>25.04.2016</a:t>
+              <a:t>02.05.2016</a:t>
             </a:fld>
             <a:endParaRPr lang="de-DE"/>
           </a:p>
@@ -657,7 +658,7 @@
             <a:fld id="{73F4CB99-C2FC-42A4-B004-24C52B80AF11}" type="datetimeFigureOut">
               <a:rPr lang="de-DE" smtClean="0"/>
               <a:pPr/>
-              <a:t>25.04.2016</a:t>
+              <a:t>02.05.2016</a:t>
             </a:fld>
             <a:endParaRPr lang="de-DE"/>
           </a:p>
@@ -824,7 +825,7 @@
             <a:fld id="{73F4CB99-C2FC-42A4-B004-24C52B80AF11}" type="datetimeFigureOut">
               <a:rPr lang="de-DE" smtClean="0"/>
               <a:pPr/>
-              <a:t>25.04.2016</a:t>
+              <a:t>02.05.2016</a:t>
             </a:fld>
             <a:endParaRPr lang="de-DE"/>
           </a:p>
@@ -1067,7 +1068,7 @@
             <a:fld id="{73F4CB99-C2FC-42A4-B004-24C52B80AF11}" type="datetimeFigureOut">
               <a:rPr lang="de-DE" smtClean="0"/>
               <a:pPr/>
-              <a:t>25.04.2016</a:t>
+              <a:t>02.05.2016</a:t>
             </a:fld>
             <a:endParaRPr lang="de-DE"/>
           </a:p>
@@ -1352,7 +1353,7 @@
             <a:fld id="{73F4CB99-C2FC-42A4-B004-24C52B80AF11}" type="datetimeFigureOut">
               <a:rPr lang="de-DE" smtClean="0"/>
               <a:pPr/>
-              <a:t>25.04.2016</a:t>
+              <a:t>02.05.2016</a:t>
             </a:fld>
             <a:endParaRPr lang="de-DE"/>
           </a:p>
@@ -1771,7 +1772,7 @@
             <a:fld id="{73F4CB99-C2FC-42A4-B004-24C52B80AF11}" type="datetimeFigureOut">
               <a:rPr lang="de-DE" smtClean="0"/>
               <a:pPr/>
-              <a:t>25.04.2016</a:t>
+              <a:t>02.05.2016</a:t>
             </a:fld>
             <a:endParaRPr lang="de-DE"/>
           </a:p>
@@ -1886,7 +1887,7 @@
             <a:fld id="{73F4CB99-C2FC-42A4-B004-24C52B80AF11}" type="datetimeFigureOut">
               <a:rPr lang="de-DE" smtClean="0"/>
               <a:pPr/>
-              <a:t>25.04.2016</a:t>
+              <a:t>02.05.2016</a:t>
             </a:fld>
             <a:endParaRPr lang="de-DE"/>
           </a:p>
@@ -1978,7 +1979,7 @@
             <a:fld id="{73F4CB99-C2FC-42A4-B004-24C52B80AF11}" type="datetimeFigureOut">
               <a:rPr lang="de-DE" smtClean="0"/>
               <a:pPr/>
-              <a:t>25.04.2016</a:t>
+              <a:t>02.05.2016</a:t>
             </a:fld>
             <a:endParaRPr lang="de-DE"/>
           </a:p>
@@ -2252,7 +2253,7 @@
             <a:fld id="{73F4CB99-C2FC-42A4-B004-24C52B80AF11}" type="datetimeFigureOut">
               <a:rPr lang="de-DE" smtClean="0"/>
               <a:pPr/>
-              <a:t>25.04.2016</a:t>
+              <a:t>02.05.2016</a:t>
             </a:fld>
             <a:endParaRPr lang="de-DE"/>
           </a:p>
@@ -2502,7 +2503,7 @@
             <a:fld id="{73F4CB99-C2FC-42A4-B004-24C52B80AF11}" type="datetimeFigureOut">
               <a:rPr lang="de-DE" smtClean="0"/>
               <a:pPr/>
-              <a:t>25.04.2016</a:t>
+              <a:t>02.05.2016</a:t>
             </a:fld>
             <a:endParaRPr lang="de-DE"/>
           </a:p>
@@ -2712,7 +2713,7 @@
             <a:fld id="{73F4CB99-C2FC-42A4-B004-24C52B80AF11}" type="datetimeFigureOut">
               <a:rPr lang="de-DE" smtClean="0"/>
               <a:pPr/>
-              <a:t>25.04.2016</a:t>
+              <a:t>02.05.2016</a:t>
             </a:fld>
             <a:endParaRPr lang="de-DE"/>
           </a:p>
@@ -7805,7 +7806,7 @@
 </p:sld>
 </file>
 
-<file path=ppt/slides/slide3.xml><?xml version="1.0" encoding="utf-8"?>
+<file path=ppt/slides/slide26.xml><?xml version="1.0" encoding="utf-8"?>
 <p:sld xmlns:a="http://schemas.openxmlformats.org/drawingml/2006/main" xmlns:r="http://schemas.openxmlformats.org/officeDocument/2006/relationships" xmlns:p="http://schemas.openxmlformats.org/presentationml/2006/main">
   <p:cSld>
     <p:spTree>
@@ -7894,7 +7895,7 @@
                 <a:latin typeface="Roboto" pitchFamily="2" charset="0"/>
                 <a:ea typeface="Roboto" pitchFamily="2" charset="0"/>
               </a:rPr>
-              <a:t>What</a:t>
+              <a:t>Let‘s</a:t>
             </a:r>
             <a:r>
               <a:rPr lang="de-DE" dirty="0" smtClean="0">
@@ -7908,7 +7909,7 @@
                 <a:latin typeface="Roboto" pitchFamily="2" charset="0"/>
                 <a:ea typeface="Roboto" pitchFamily="2" charset="0"/>
               </a:rPr>
-              <a:t>is</a:t>
+              <a:t>see</a:t>
             </a:r>
             <a:r>
               <a:rPr lang="de-DE" dirty="0" smtClean="0">
@@ -7922,14 +7923,28 @@
                 <a:latin typeface="Roboto" pitchFamily="2" charset="0"/>
                 <a:ea typeface="Roboto" pitchFamily="2" charset="0"/>
               </a:rPr>
-              <a:t>Kotlin</a:t>
+              <a:t>some</a:t>
             </a:r>
             <a:r>
               <a:rPr lang="de-DE" dirty="0" smtClean="0">
                 <a:latin typeface="Roboto" pitchFamily="2" charset="0"/>
                 <a:ea typeface="Roboto" pitchFamily="2" charset="0"/>
               </a:rPr>
-              <a:t>?</a:t>
+              <a:t> </a:t>
+            </a:r>
+            <a:r>
+              <a:rPr lang="de-DE" dirty="0" err="1" smtClean="0">
+                <a:latin typeface="Roboto" pitchFamily="2" charset="0"/>
+                <a:ea typeface="Roboto" pitchFamily="2" charset="0"/>
+              </a:rPr>
+              <a:t>code</a:t>
+            </a:r>
+            <a:r>
+              <a:rPr lang="de-DE" dirty="0" smtClean="0">
+                <a:latin typeface="Roboto" pitchFamily="2" charset="0"/>
+                <a:ea typeface="Roboto" pitchFamily="2" charset="0"/>
+              </a:rPr>
+              <a:t>!</a:t>
             </a:r>
             <a:endParaRPr lang="de-DE" dirty="0">
               <a:latin typeface="Roboto" pitchFamily="2" charset="0"/>
@@ -7947,7 +7962,7 @@
         <p:spPr>
           <a:xfrm>
             <a:off x="467544" y="1988840"/>
-            <a:ext cx="8208912" cy="1938992"/>
+            <a:ext cx="8208912" cy="3785652"/>
           </a:xfrm>
           <a:prstGeom prst="rect">
             <a:avLst/>
@@ -7965,25 +7980,50 @@
                 <a:spcPct val="250000"/>
               </a:lnSpc>
             </a:pPr>
+            <a:endParaRPr lang="de-DE" sz="2400" dirty="0" smtClean="0">
+              <a:latin typeface="Roboto" pitchFamily="2" charset="0"/>
+              <a:ea typeface="Roboto" pitchFamily="2" charset="0"/>
+            </a:endParaRPr>
+          </a:p>
+          <a:p>
+            <a:pPr algn="ctr">
+              <a:lnSpc>
+                <a:spcPct val="250000"/>
+              </a:lnSpc>
+            </a:pPr>
             <a:r>
               <a:rPr lang="de-DE" sz="2400" dirty="0" smtClean="0">
                 <a:latin typeface="Roboto" pitchFamily="2" charset="0"/>
                 <a:ea typeface="Roboto" pitchFamily="2" charset="0"/>
               </a:rPr>
-              <a:t>Language </a:t>
+              <a:t>Take </a:t>
             </a:r>
             <a:r>
               <a:rPr lang="de-DE" sz="2400" dirty="0" err="1" smtClean="0">
                 <a:latin typeface="Roboto" pitchFamily="2" charset="0"/>
                 <a:ea typeface="Roboto" pitchFamily="2" charset="0"/>
               </a:rPr>
-              <a:t>for</a:t>
+              <a:t>your</a:t>
             </a:r>
             <a:r>
               <a:rPr lang="de-DE" sz="2400" dirty="0" smtClean="0">
                 <a:latin typeface="Roboto" pitchFamily="2" charset="0"/>
                 <a:ea typeface="Roboto" pitchFamily="2" charset="0"/>
               </a:rPr>
+              <a:t> time </a:t>
+            </a:r>
+            <a:r>
+              <a:rPr lang="de-DE" sz="2400" dirty="0" err="1" smtClean="0">
+                <a:latin typeface="Roboto" pitchFamily="2" charset="0"/>
+                <a:ea typeface="Roboto" pitchFamily="2" charset="0"/>
+              </a:rPr>
+              <a:t>and</a:t>
+            </a:r>
+            <a:r>
+              <a:rPr lang="de-DE" sz="2400" dirty="0" smtClean="0">
+                <a:latin typeface="Roboto" pitchFamily="2" charset="0"/>
+                <a:ea typeface="Roboto" pitchFamily="2" charset="0"/>
+              </a:rPr>
               <a:t> </a:t>
             </a:r>
             <a:r>
@@ -7991,15 +8031,70 @@
                 <a:latin typeface="Roboto" pitchFamily="2" charset="0"/>
                 <a:ea typeface="Roboto" pitchFamily="2" charset="0"/>
               </a:rPr>
-              <a:t>the</a:t>
+              <a:t>have</a:t>
             </a:r>
             <a:r>
               <a:rPr lang="de-DE" sz="2400" dirty="0" smtClean="0">
                 <a:latin typeface="Roboto" pitchFamily="2" charset="0"/>
                 <a:ea typeface="Roboto" pitchFamily="2" charset="0"/>
               </a:rPr>
-              <a:t> JVM</a:t>
-            </a:r>
+              <a:t> a </a:t>
+            </a:r>
+            <a:r>
+              <a:rPr lang="de-DE" sz="2400" dirty="0" err="1" smtClean="0">
+                <a:latin typeface="Roboto" pitchFamily="2" charset="0"/>
+                <a:ea typeface="Roboto" pitchFamily="2" charset="0"/>
+              </a:rPr>
+              <a:t>second</a:t>
+            </a:r>
+            <a:r>
+              <a:rPr lang="de-DE" sz="2400" dirty="0" smtClean="0">
+                <a:latin typeface="Roboto" pitchFamily="2" charset="0"/>
+                <a:ea typeface="Roboto" pitchFamily="2" charset="0"/>
+              </a:rPr>
+              <a:t> </a:t>
+            </a:r>
+            <a:r>
+              <a:rPr lang="de-DE" sz="2400" dirty="0" err="1" smtClean="0">
+                <a:latin typeface="Roboto" pitchFamily="2" charset="0"/>
+                <a:ea typeface="Roboto" pitchFamily="2" charset="0"/>
+              </a:rPr>
+              <a:t>look</a:t>
+            </a:r>
+            <a:r>
+              <a:rPr lang="de-DE" sz="2400" dirty="0" smtClean="0">
+                <a:latin typeface="Roboto" pitchFamily="2" charset="0"/>
+                <a:ea typeface="Roboto" pitchFamily="2" charset="0"/>
+              </a:rPr>
+              <a:t>:</a:t>
+            </a:r>
+          </a:p>
+          <a:p>
+            <a:pPr algn="ctr">
+              <a:lnSpc>
+                <a:spcPct val="250000"/>
+              </a:lnSpc>
+            </a:pPr>
+            <a:r>
+              <a:rPr lang="de-DE" sz="2400" dirty="0" smtClean="0">
+                <a:latin typeface="Roboto" pitchFamily="2" charset="0"/>
+                <a:ea typeface="Roboto" pitchFamily="2" charset="0"/>
+                <a:hlinkClick r:id="rId3"/>
+              </a:rPr>
+              <a:t>https://</a:t>
+            </a:r>
+            <a:r>
+              <a:rPr lang="de-DE" sz="2400" dirty="0" smtClean="0">
+                <a:latin typeface="Roboto" pitchFamily="2" charset="0"/>
+                <a:ea typeface="Roboto" pitchFamily="2" charset="0"/>
+                <a:hlinkClick r:id="rId3"/>
+              </a:rPr>
+              <a:t>github.com/ISchwarz23/Kotlin-Friday-Lunch-Talk</a:t>
+            </a:r>
+            <a:endParaRPr lang="de-DE" sz="2400" dirty="0" smtClean="0">
+              <a:latin typeface="Roboto" pitchFamily="2" charset="0"/>
+              <a:ea typeface="Roboto" pitchFamily="2" charset="0"/>
+            </a:endParaRPr>
           </a:p>
           <a:p>
             <a:pPr algn="ctr">
@@ -8029,7 +8124,7 @@
 </p:sld>
 </file>
 
-<file path=ppt/slides/slide4.xml><?xml version="1.0" encoding="utf-8"?>
+<file path=ppt/slides/slide3.xml><?xml version="1.0" encoding="utf-8"?>
 <p:sld xmlns:a="http://schemas.openxmlformats.org/drawingml/2006/main" xmlns:r="http://schemas.openxmlformats.org/officeDocument/2006/relationships" xmlns:p="http://schemas.openxmlformats.org/presentationml/2006/main">
   <p:cSld>
     <p:spTree>
@@ -8191,11 +8286,6 @@
             </a:pPr>
             <a:r>
               <a:rPr lang="de-DE" sz="2400" dirty="0" smtClean="0">
-                <a:solidFill>
-                  <a:schemeClr val="bg1">
-                    <a:lumMod val="50000"/>
-                  </a:schemeClr>
-                </a:solidFill>
                 <a:latin typeface="Roboto" pitchFamily="2" charset="0"/>
                 <a:ea typeface="Roboto" pitchFamily="2" charset="0"/>
               </a:rPr>
@@ -8203,11 +8293,6 @@
             </a:r>
             <a:r>
               <a:rPr lang="de-DE" sz="2400" dirty="0" err="1" smtClean="0">
-                <a:solidFill>
-                  <a:schemeClr val="bg1">
-                    <a:lumMod val="50000"/>
-                  </a:schemeClr>
-                </a:solidFill>
                 <a:latin typeface="Roboto" pitchFamily="2" charset="0"/>
                 <a:ea typeface="Roboto" pitchFamily="2" charset="0"/>
               </a:rPr>
@@ -8215,11 +8300,6 @@
             </a:r>
             <a:r>
               <a:rPr lang="de-DE" sz="2400" dirty="0" smtClean="0">
-                <a:solidFill>
-                  <a:schemeClr val="bg1">
-                    <a:lumMod val="50000"/>
-                  </a:schemeClr>
-                </a:solidFill>
                 <a:latin typeface="Roboto" pitchFamily="2" charset="0"/>
                 <a:ea typeface="Roboto" pitchFamily="2" charset="0"/>
               </a:rPr>
@@ -8227,11 +8307,6 @@
             </a:r>
             <a:r>
               <a:rPr lang="de-DE" sz="2400" dirty="0" err="1" smtClean="0">
-                <a:solidFill>
-                  <a:schemeClr val="bg1">
-                    <a:lumMod val="50000"/>
-                  </a:schemeClr>
-                </a:solidFill>
                 <a:latin typeface="Roboto" pitchFamily="2" charset="0"/>
                 <a:ea typeface="Roboto" pitchFamily="2" charset="0"/>
               </a:rPr>
@@ -8239,11 +8314,6 @@
             </a:r>
             <a:r>
               <a:rPr lang="de-DE" sz="2400" dirty="0" smtClean="0">
-                <a:solidFill>
-                  <a:schemeClr val="bg1">
-                    <a:lumMod val="50000"/>
-                  </a:schemeClr>
-                </a:solidFill>
                 <a:latin typeface="Roboto" pitchFamily="2" charset="0"/>
                 <a:ea typeface="Roboto" pitchFamily="2" charset="0"/>
               </a:rPr>
@@ -8256,41 +8326,6 @@
                 <a:spcPct val="250000"/>
               </a:lnSpc>
             </a:pPr>
-            <a:r>
-              <a:rPr lang="de-DE" sz="2400" dirty="0" err="1" smtClean="0">
-                <a:latin typeface="Roboto" pitchFamily="2" charset="0"/>
-                <a:ea typeface="Roboto" pitchFamily="2" charset="0"/>
-              </a:rPr>
-              <a:t>Created</a:t>
-            </a:r>
-            <a:r>
-              <a:rPr lang="de-DE" sz="2400" dirty="0" smtClean="0">
-                <a:latin typeface="Roboto" pitchFamily="2" charset="0"/>
-                <a:ea typeface="Roboto" pitchFamily="2" charset="0"/>
-              </a:rPr>
-              <a:t> </a:t>
-            </a:r>
-            <a:r>
-              <a:rPr lang="de-DE" sz="2400" dirty="0" err="1" smtClean="0">
-                <a:latin typeface="Roboto" pitchFamily="2" charset="0"/>
-                <a:ea typeface="Roboto" pitchFamily="2" charset="0"/>
-              </a:rPr>
-              <a:t>by</a:t>
-            </a:r>
-            <a:r>
-              <a:rPr lang="de-DE" sz="2400" dirty="0" smtClean="0">
-                <a:latin typeface="Roboto" pitchFamily="2" charset="0"/>
-                <a:ea typeface="Roboto" pitchFamily="2" charset="0"/>
-              </a:rPr>
-              <a:t> </a:t>
-            </a:r>
-            <a:r>
-              <a:rPr lang="de-DE" sz="2400" dirty="0" err="1" smtClean="0">
-                <a:latin typeface="Roboto" pitchFamily="2" charset="0"/>
-                <a:ea typeface="Roboto" pitchFamily="2" charset="0"/>
-              </a:rPr>
-              <a:t>JetBrains</a:t>
-            </a:r>
             <a:endParaRPr lang="de-DE" sz="2400" dirty="0">
               <a:latin typeface="Roboto" pitchFamily="2" charset="0"/>
               <a:ea typeface="Roboto" pitchFamily="2" charset="0"/>
@@ -8313,7 +8348,7 @@
 </p:sld>
 </file>
 
-<file path=ppt/slides/slide5.xml><?xml version="1.0" encoding="utf-8"?>
+<file path=ppt/slides/slide4.xml><?xml version="1.0" encoding="utf-8"?>
 <p:sld xmlns:a="http://schemas.openxmlformats.org/drawingml/2006/main" xmlns:r="http://schemas.openxmlformats.org/officeDocument/2006/relationships" xmlns:p="http://schemas.openxmlformats.org/presentationml/2006/main">
   <p:cSld>
     <p:spTree>
@@ -8455,7 +8490,7 @@
         <p:spPr>
           <a:xfrm>
             <a:off x="467544" y="1988840"/>
-            <a:ext cx="8208912" cy="3785652"/>
+            <a:ext cx="8208912" cy="1938992"/>
           </a:xfrm>
           <a:prstGeom prst="rect">
             <a:avLst/>
@@ -8542,11 +8577,6 @@
             </a:pPr>
             <a:r>
               <a:rPr lang="de-DE" sz="2400" dirty="0" err="1" smtClean="0">
-                <a:solidFill>
-                  <a:schemeClr val="bg1">
-                    <a:lumMod val="50000"/>
-                  </a:schemeClr>
-                </a:solidFill>
                 <a:latin typeface="Roboto" pitchFamily="2" charset="0"/>
                 <a:ea typeface="Roboto" pitchFamily="2" charset="0"/>
               </a:rPr>
@@ -8554,11 +8584,6 @@
             </a:r>
             <a:r>
               <a:rPr lang="de-DE" sz="2400" dirty="0" smtClean="0">
-                <a:solidFill>
-                  <a:schemeClr val="bg1">
-                    <a:lumMod val="50000"/>
-                  </a:schemeClr>
-                </a:solidFill>
                 <a:latin typeface="Roboto" pitchFamily="2" charset="0"/>
                 <a:ea typeface="Roboto" pitchFamily="2" charset="0"/>
               </a:rPr>
@@ -8566,11 +8591,6 @@
             </a:r>
             <a:r>
               <a:rPr lang="de-DE" sz="2400" dirty="0" err="1" smtClean="0">
-                <a:solidFill>
-                  <a:schemeClr val="bg1">
-                    <a:lumMod val="50000"/>
-                  </a:schemeClr>
-                </a:solidFill>
                 <a:latin typeface="Roboto" pitchFamily="2" charset="0"/>
                 <a:ea typeface="Roboto" pitchFamily="2" charset="0"/>
               </a:rPr>
@@ -8578,11 +8598,6 @@
             </a:r>
             <a:r>
               <a:rPr lang="de-DE" sz="2400" dirty="0" smtClean="0">
-                <a:solidFill>
-                  <a:schemeClr val="bg1">
-                    <a:lumMod val="50000"/>
-                  </a:schemeClr>
-                </a:solidFill>
                 <a:latin typeface="Roboto" pitchFamily="2" charset="0"/>
                 <a:ea typeface="Roboto" pitchFamily="2" charset="0"/>
               </a:rPr>
@@ -8590,90 +8605,11 @@
             </a:r>
             <a:r>
               <a:rPr lang="de-DE" sz="2400" dirty="0" err="1" smtClean="0">
-                <a:solidFill>
-                  <a:schemeClr val="bg1">
-                    <a:lumMod val="50000"/>
-                  </a:schemeClr>
-                </a:solidFill>
                 <a:latin typeface="Roboto" pitchFamily="2" charset="0"/>
                 <a:ea typeface="Roboto" pitchFamily="2" charset="0"/>
               </a:rPr>
               <a:t>JetBrains</a:t>
             </a:r>
-            <a:endParaRPr lang="de-DE" sz="2400" dirty="0" smtClean="0">
-              <a:solidFill>
-                <a:schemeClr val="bg1">
-                  <a:lumMod val="50000"/>
-                </a:schemeClr>
-              </a:solidFill>
-              <a:latin typeface="Roboto" pitchFamily="2" charset="0"/>
-              <a:ea typeface="Roboto" pitchFamily="2" charset="0"/>
-            </a:endParaRPr>
-          </a:p>
-          <a:p>
-            <a:pPr algn="ctr">
-              <a:lnSpc>
-                <a:spcPct val="250000"/>
-              </a:lnSpc>
-            </a:pPr>
-            <a:r>
-              <a:rPr lang="de-DE" sz="2400" dirty="0" smtClean="0">
-                <a:latin typeface="Roboto" pitchFamily="2" charset="0"/>
-                <a:ea typeface="Roboto" pitchFamily="2" charset="0"/>
-              </a:rPr>
-              <a:t>Version 1.0 was </a:t>
-            </a:r>
-            <a:r>
-              <a:rPr lang="de-DE" sz="2400" dirty="0" err="1" smtClean="0">
-                <a:latin typeface="Roboto" pitchFamily="2" charset="0"/>
-                <a:ea typeface="Roboto" pitchFamily="2" charset="0"/>
-              </a:rPr>
-              <a:t>released</a:t>
-            </a:r>
-            <a:r>
-              <a:rPr lang="de-DE" sz="2400" dirty="0" smtClean="0">
-                <a:latin typeface="Roboto" pitchFamily="2" charset="0"/>
-                <a:ea typeface="Roboto" pitchFamily="2" charset="0"/>
-              </a:rPr>
-              <a:t> on </a:t>
-            </a:r>
-            <a:r>
-              <a:rPr lang="de-DE" sz="2400" dirty="0" err="1" smtClean="0">
-                <a:latin typeface="Roboto" pitchFamily="2" charset="0"/>
-                <a:ea typeface="Roboto" pitchFamily="2" charset="0"/>
-              </a:rPr>
-              <a:t>the</a:t>
-            </a:r>
-            <a:r>
-              <a:rPr lang="de-DE" sz="2400" dirty="0" smtClean="0">
-                <a:latin typeface="Roboto" pitchFamily="2" charset="0"/>
-                <a:ea typeface="Roboto" pitchFamily="2" charset="0"/>
-              </a:rPr>
-              <a:t> 15th </a:t>
-            </a:r>
-            <a:r>
-              <a:rPr lang="de-DE" sz="2400" dirty="0" err="1" smtClean="0">
-                <a:latin typeface="Roboto" pitchFamily="2" charset="0"/>
-                <a:ea typeface="Roboto" pitchFamily="2" charset="0"/>
-              </a:rPr>
-              <a:t>February</a:t>
-            </a:r>
-            <a:r>
-              <a:rPr lang="de-DE" sz="2400" dirty="0" smtClean="0">
-                <a:latin typeface="Roboto" pitchFamily="2" charset="0"/>
-                <a:ea typeface="Roboto" pitchFamily="2" charset="0"/>
-              </a:rPr>
-              <a:t> 2016</a:t>
-            </a:r>
-          </a:p>
-          <a:p>
-            <a:pPr algn="ctr">
-              <a:lnSpc>
-                <a:spcPct val="250000"/>
-              </a:lnSpc>
-              <a:buFont typeface="Wingdings" pitchFamily="2" charset="2"/>
-              <a:buChar char="§"/>
-            </a:pPr>
             <a:endParaRPr lang="de-DE" sz="2400" dirty="0">
               <a:latin typeface="Roboto" pitchFamily="2" charset="0"/>
               <a:ea typeface="Roboto" pitchFamily="2" charset="0"/>
@@ -8696,7 +8632,7 @@
 </p:sld>
 </file>
 
-<file path=ppt/slides/slide6.xml><?xml version="1.0" encoding="utf-8"?>
+<file path=ppt/slides/slide5.xml><?xml version="1.0" encoding="utf-8"?>
 <p:sld xmlns:a="http://schemas.openxmlformats.org/drawingml/2006/main" xmlns:r="http://schemas.openxmlformats.org/officeDocument/2006/relationships" xmlns:p="http://schemas.openxmlformats.org/presentationml/2006/main">
   <p:cSld>
     <p:spTree>
@@ -9001,6 +8937,246 @@
             </a:pPr>
             <a:r>
               <a:rPr lang="de-DE" sz="2400" dirty="0" smtClean="0">
+                <a:latin typeface="Roboto" pitchFamily="2" charset="0"/>
+                <a:ea typeface="Roboto" pitchFamily="2" charset="0"/>
+              </a:rPr>
+              <a:t>Version 1.0 was </a:t>
+            </a:r>
+            <a:r>
+              <a:rPr lang="de-DE" sz="2400" dirty="0" err="1" smtClean="0">
+                <a:latin typeface="Roboto" pitchFamily="2" charset="0"/>
+                <a:ea typeface="Roboto" pitchFamily="2" charset="0"/>
+              </a:rPr>
+              <a:t>released</a:t>
+            </a:r>
+            <a:r>
+              <a:rPr lang="de-DE" sz="2400" dirty="0" smtClean="0">
+                <a:latin typeface="Roboto" pitchFamily="2" charset="0"/>
+                <a:ea typeface="Roboto" pitchFamily="2" charset="0"/>
+              </a:rPr>
+              <a:t> on </a:t>
+            </a:r>
+            <a:r>
+              <a:rPr lang="de-DE" sz="2400" dirty="0" err="1" smtClean="0">
+                <a:latin typeface="Roboto" pitchFamily="2" charset="0"/>
+                <a:ea typeface="Roboto" pitchFamily="2" charset="0"/>
+              </a:rPr>
+              <a:t>the</a:t>
+            </a:r>
+            <a:r>
+              <a:rPr lang="de-DE" sz="2400" dirty="0" smtClean="0">
+                <a:latin typeface="Roboto" pitchFamily="2" charset="0"/>
+                <a:ea typeface="Roboto" pitchFamily="2" charset="0"/>
+              </a:rPr>
+              <a:t> 15th </a:t>
+            </a:r>
+            <a:r>
+              <a:rPr lang="de-DE" sz="2400" dirty="0" err="1" smtClean="0">
+                <a:latin typeface="Roboto" pitchFamily="2" charset="0"/>
+                <a:ea typeface="Roboto" pitchFamily="2" charset="0"/>
+              </a:rPr>
+              <a:t>February</a:t>
+            </a:r>
+            <a:r>
+              <a:rPr lang="de-DE" sz="2400" dirty="0" smtClean="0">
+                <a:latin typeface="Roboto" pitchFamily="2" charset="0"/>
+                <a:ea typeface="Roboto" pitchFamily="2" charset="0"/>
+              </a:rPr>
+              <a:t> 2016</a:t>
+            </a:r>
+          </a:p>
+          <a:p>
+            <a:pPr algn="ctr">
+              <a:lnSpc>
+                <a:spcPct val="250000"/>
+              </a:lnSpc>
+              <a:buFont typeface="Wingdings" pitchFamily="2" charset="2"/>
+              <a:buChar char="§"/>
+            </a:pPr>
+            <a:endParaRPr lang="de-DE" sz="2400" dirty="0">
+              <a:latin typeface="Roboto" pitchFamily="2" charset="0"/>
+              <a:ea typeface="Roboto" pitchFamily="2" charset="0"/>
+            </a:endParaRPr>
+          </a:p>
+        </p:txBody>
+      </p:sp>
+    </p:spTree>
+  </p:cSld>
+  <p:clrMapOvr>
+    <a:masterClrMapping/>
+  </p:clrMapOvr>
+  <p:timing>
+    <p:tnLst>
+      <p:par>
+        <p:cTn id="1" dur="indefinite" restart="never" nodeType="tmRoot"/>
+      </p:par>
+    </p:tnLst>
+  </p:timing>
+</p:sld>
+</file>
+
+<file path=ppt/slides/slide6.xml><?xml version="1.0" encoding="utf-8"?>
+<p:sld xmlns:a="http://schemas.openxmlformats.org/drawingml/2006/main" xmlns:r="http://schemas.openxmlformats.org/officeDocument/2006/relationships" xmlns:p="http://schemas.openxmlformats.org/presentationml/2006/main">
+  <p:cSld>
+    <p:spTree>
+      <p:nvGrpSpPr>
+        <p:cNvPr id="1" name=""/>
+        <p:cNvGrpSpPr/>
+        <p:nvPr/>
+      </p:nvGrpSpPr>
+      <p:grpSpPr>
+        <a:xfrm>
+          <a:off x="0" y="0"/>
+          <a:ext cx="0" cy="0"/>
+          <a:chOff x="0" y="0"/>
+          <a:chExt cx="0" cy="0"/>
+        </a:xfrm>
+      </p:grpSpPr>
+      <p:sp>
+        <p:nvSpPr>
+          <p:cNvPr id="4" name="Rechteck 3"/>
+          <p:cNvSpPr/>
+          <p:nvPr/>
+        </p:nvSpPr>
+        <p:spPr>
+          <a:xfrm>
+            <a:off x="-577080" y="1844824"/>
+            <a:ext cx="9721080" cy="5472608"/>
+          </a:xfrm>
+          <a:prstGeom prst="rect">
+            <a:avLst/>
+          </a:prstGeom>
+          <a:blipFill dpi="0" rotWithShape="1">
+            <a:blip r:embed="rId2" cstate="print">
+              <a:alphaModFix amt="50000"/>
+            </a:blip>
+            <a:srcRect/>
+            <a:stretch>
+              <a:fillRect/>
+            </a:stretch>
+          </a:blipFill>
+          <a:ln>
+            <a:noFill/>
+          </a:ln>
+        </p:spPr>
+        <p:style>
+          <a:lnRef idx="2">
+            <a:schemeClr val="accent1">
+              <a:shade val="50000"/>
+            </a:schemeClr>
+          </a:lnRef>
+          <a:fillRef idx="1">
+            <a:schemeClr val="accent1"/>
+          </a:fillRef>
+          <a:effectRef idx="0">
+            <a:schemeClr val="accent1"/>
+          </a:effectRef>
+          <a:fontRef idx="minor">
+            <a:schemeClr val="lt1"/>
+          </a:fontRef>
+        </p:style>
+        <p:txBody>
+          <a:bodyPr rtlCol="0" anchor="ctr"/>
+          <a:lstStyle/>
+          <a:p>
+            <a:pPr algn="ctr"/>
+            <a:endParaRPr lang="de-DE"/>
+          </a:p>
+        </p:txBody>
+      </p:sp>
+      <p:sp>
+        <p:nvSpPr>
+          <p:cNvPr id="2" name="Titel 1"/>
+          <p:cNvSpPr>
+            <a:spLocks noGrp="1"/>
+          </p:cNvSpPr>
+          <p:nvPr>
+            <p:ph type="title"/>
+          </p:nvPr>
+        </p:nvSpPr>
+        <p:spPr/>
+        <p:txBody>
+          <a:bodyPr/>
+          <a:lstStyle/>
+          <a:p>
+            <a:r>
+              <a:rPr lang="de-DE" dirty="0" err="1" smtClean="0">
+                <a:latin typeface="Roboto" pitchFamily="2" charset="0"/>
+                <a:ea typeface="Roboto" pitchFamily="2" charset="0"/>
+              </a:rPr>
+              <a:t>What</a:t>
+            </a:r>
+            <a:r>
+              <a:rPr lang="de-DE" dirty="0" smtClean="0">
+                <a:latin typeface="Roboto" pitchFamily="2" charset="0"/>
+                <a:ea typeface="Roboto" pitchFamily="2" charset="0"/>
+              </a:rPr>
+              <a:t> </a:t>
+            </a:r>
+            <a:r>
+              <a:rPr lang="de-DE" dirty="0" err="1" smtClean="0">
+                <a:latin typeface="Roboto" pitchFamily="2" charset="0"/>
+                <a:ea typeface="Roboto" pitchFamily="2" charset="0"/>
+              </a:rPr>
+              <a:t>is</a:t>
+            </a:r>
+            <a:r>
+              <a:rPr lang="de-DE" dirty="0" smtClean="0">
+                <a:latin typeface="Roboto" pitchFamily="2" charset="0"/>
+                <a:ea typeface="Roboto" pitchFamily="2" charset="0"/>
+              </a:rPr>
+              <a:t> </a:t>
+            </a:r>
+            <a:r>
+              <a:rPr lang="de-DE" dirty="0" err="1" smtClean="0">
+                <a:latin typeface="Roboto" pitchFamily="2" charset="0"/>
+                <a:ea typeface="Roboto" pitchFamily="2" charset="0"/>
+              </a:rPr>
+              <a:t>Kotlin</a:t>
+            </a:r>
+            <a:r>
+              <a:rPr lang="de-DE" dirty="0" smtClean="0">
+                <a:latin typeface="Roboto" pitchFamily="2" charset="0"/>
+                <a:ea typeface="Roboto" pitchFamily="2" charset="0"/>
+              </a:rPr>
+              <a:t>?</a:t>
+            </a:r>
+            <a:endParaRPr lang="de-DE" dirty="0">
+              <a:latin typeface="Roboto" pitchFamily="2" charset="0"/>
+              <a:ea typeface="Roboto" pitchFamily="2" charset="0"/>
+            </a:endParaRPr>
+          </a:p>
+        </p:txBody>
+      </p:sp>
+      <p:sp>
+        <p:nvSpPr>
+          <p:cNvPr id="5" name="Textfeld 4"/>
+          <p:cNvSpPr txBox="1"/>
+          <p:nvPr/>
+        </p:nvSpPr>
+        <p:spPr>
+          <a:xfrm>
+            <a:off x="467544" y="1988840"/>
+            <a:ext cx="8208912" cy="3785652"/>
+          </a:xfrm>
+          <a:prstGeom prst="rect">
+            <a:avLst/>
+          </a:prstGeom>
+          <a:noFill/>
+        </p:spPr>
+        <p:txBody>
+          <a:bodyPr wrap="square" rtlCol="0">
+            <a:spAutoFit/>
+          </a:bodyPr>
+          <a:lstStyle/>
+          <a:p>
+            <a:pPr algn="ctr">
+              <a:lnSpc>
+                <a:spcPct val="250000"/>
+              </a:lnSpc>
+            </a:pPr>
+            <a:r>
+              <a:rPr lang="de-DE" sz="2400" dirty="0" smtClean="0">
                 <a:solidFill>
                   <a:schemeClr val="bg1">
                     <a:lumMod val="50000"/>
@@ -9009,7 +9185,7 @@
                 <a:latin typeface="Roboto" pitchFamily="2" charset="0"/>
                 <a:ea typeface="Roboto" pitchFamily="2" charset="0"/>
               </a:rPr>
-              <a:t>Version 1.0 was </a:t>
+              <a:t>Language </a:t>
             </a:r>
             <a:r>
               <a:rPr lang="de-DE" sz="2400" dirty="0" err="1" smtClean="0">
@@ -9021,7 +9197,7 @@
                 <a:latin typeface="Roboto" pitchFamily="2" charset="0"/>
                 <a:ea typeface="Roboto" pitchFamily="2" charset="0"/>
               </a:rPr>
-              <a:t>released</a:t>
+              <a:t>for</a:t>
             </a:r>
             <a:r>
               <a:rPr lang="de-DE" sz="2400" dirty="0" smtClean="0">
@@ -9033,7 +9209,7 @@
                 <a:latin typeface="Roboto" pitchFamily="2" charset="0"/>
                 <a:ea typeface="Roboto" pitchFamily="2" charset="0"/>
               </a:rPr>
-              <a:t> on </a:t>
+              <a:t> </a:t>
             </a:r>
             <a:r>
               <a:rPr lang="de-DE" sz="2400" dirty="0" err="1" smtClean="0">
@@ -9057,8 +9233,15 @@
                 <a:latin typeface="Roboto" pitchFamily="2" charset="0"/>
                 <a:ea typeface="Roboto" pitchFamily="2" charset="0"/>
               </a:rPr>
-              <a:t> 15th </a:t>
-            </a:r>
+              <a:t> JVM</a:t>
+            </a:r>
+          </a:p>
+          <a:p>
+            <a:pPr algn="ctr">
+              <a:lnSpc>
+                <a:spcPct val="250000"/>
+              </a:lnSpc>
+            </a:pPr>
             <a:r>
               <a:rPr lang="de-DE" sz="2400" dirty="0" err="1" smtClean="0">
                 <a:solidFill>
@@ -9069,7 +9252,7 @@
                 <a:latin typeface="Roboto" pitchFamily="2" charset="0"/>
                 <a:ea typeface="Roboto" pitchFamily="2" charset="0"/>
               </a:rPr>
-              <a:t>February</a:t>
+              <a:t>Created</a:t>
             </a:r>
             <a:r>
               <a:rPr lang="de-DE" sz="2400" dirty="0" smtClean="0">
@@ -9084,7 +9267,7 @@
               <a:t> </a:t>
             </a:r>
             <a:r>
-              <a:rPr lang="de-DE" sz="2400" dirty="0" smtClean="0">
+              <a:rPr lang="de-DE" sz="2400" dirty="0" err="1" smtClean="0">
                 <a:solidFill>
                   <a:schemeClr val="bg1">
                     <a:lumMod val="50000"/>
@@ -9093,7 +9276,131 @@
                 <a:latin typeface="Roboto" pitchFamily="2" charset="0"/>
                 <a:ea typeface="Roboto" pitchFamily="2" charset="0"/>
               </a:rPr>
-              <a:t>2016</a:t>
+              <a:t>by</a:t>
+            </a:r>
+            <a:r>
+              <a:rPr lang="de-DE" sz="2400" dirty="0" smtClean="0">
+                <a:solidFill>
+                  <a:schemeClr val="bg1">
+                    <a:lumMod val="50000"/>
+                  </a:schemeClr>
+                </a:solidFill>
+                <a:latin typeface="Roboto" pitchFamily="2" charset="0"/>
+                <a:ea typeface="Roboto" pitchFamily="2" charset="0"/>
+              </a:rPr>
+              <a:t> </a:t>
+            </a:r>
+            <a:r>
+              <a:rPr lang="de-DE" sz="2400" dirty="0" err="1" smtClean="0">
+                <a:solidFill>
+                  <a:schemeClr val="bg1">
+                    <a:lumMod val="50000"/>
+                  </a:schemeClr>
+                </a:solidFill>
+                <a:latin typeface="Roboto" pitchFamily="2" charset="0"/>
+                <a:ea typeface="Roboto" pitchFamily="2" charset="0"/>
+              </a:rPr>
+              <a:t>JetBrains</a:t>
+            </a:r>
+            <a:endParaRPr lang="de-DE" sz="2400" dirty="0" smtClean="0">
+              <a:solidFill>
+                <a:schemeClr val="bg1">
+                  <a:lumMod val="50000"/>
+                </a:schemeClr>
+              </a:solidFill>
+              <a:latin typeface="Roboto" pitchFamily="2" charset="0"/>
+              <a:ea typeface="Roboto" pitchFamily="2" charset="0"/>
+            </a:endParaRPr>
+          </a:p>
+          <a:p>
+            <a:pPr algn="ctr">
+              <a:lnSpc>
+                <a:spcPct val="250000"/>
+              </a:lnSpc>
+            </a:pPr>
+            <a:r>
+              <a:rPr lang="de-DE" sz="2400" dirty="0" smtClean="0">
+                <a:solidFill>
+                  <a:schemeClr val="bg1">
+                    <a:lumMod val="50000"/>
+                  </a:schemeClr>
+                </a:solidFill>
+                <a:latin typeface="Roboto" pitchFamily="2" charset="0"/>
+                <a:ea typeface="Roboto" pitchFamily="2" charset="0"/>
+              </a:rPr>
+              <a:t>Version 1.0 was </a:t>
+            </a:r>
+            <a:r>
+              <a:rPr lang="de-DE" sz="2400" dirty="0" err="1" smtClean="0">
+                <a:solidFill>
+                  <a:schemeClr val="bg1">
+                    <a:lumMod val="50000"/>
+                  </a:schemeClr>
+                </a:solidFill>
+                <a:latin typeface="Roboto" pitchFamily="2" charset="0"/>
+                <a:ea typeface="Roboto" pitchFamily="2" charset="0"/>
+              </a:rPr>
+              <a:t>released</a:t>
+            </a:r>
+            <a:r>
+              <a:rPr lang="de-DE" sz="2400" dirty="0" smtClean="0">
+                <a:solidFill>
+                  <a:schemeClr val="bg1">
+                    <a:lumMod val="50000"/>
+                  </a:schemeClr>
+                </a:solidFill>
+                <a:latin typeface="Roboto" pitchFamily="2" charset="0"/>
+                <a:ea typeface="Roboto" pitchFamily="2" charset="0"/>
+              </a:rPr>
+              <a:t> on </a:t>
+            </a:r>
+            <a:r>
+              <a:rPr lang="de-DE" sz="2400" dirty="0" err="1" smtClean="0">
+                <a:solidFill>
+                  <a:schemeClr val="bg1">
+                    <a:lumMod val="50000"/>
+                  </a:schemeClr>
+                </a:solidFill>
+                <a:latin typeface="Roboto" pitchFamily="2" charset="0"/>
+                <a:ea typeface="Roboto" pitchFamily="2" charset="0"/>
+              </a:rPr>
+              <a:t>the</a:t>
+            </a:r>
+            <a:r>
+              <a:rPr lang="de-DE" sz="2400" dirty="0" smtClean="0">
+                <a:solidFill>
+                  <a:schemeClr val="bg1">
+                    <a:lumMod val="50000"/>
+                  </a:schemeClr>
+                </a:solidFill>
+                <a:latin typeface="Roboto" pitchFamily="2" charset="0"/>
+                <a:ea typeface="Roboto" pitchFamily="2" charset="0"/>
+              </a:rPr>
+              <a:t> 15th </a:t>
+            </a:r>
+            <a:r>
+              <a:rPr lang="de-DE" sz="2400" dirty="0" err="1" smtClean="0">
+                <a:solidFill>
+                  <a:schemeClr val="bg1">
+                    <a:lumMod val="50000"/>
+                  </a:schemeClr>
+                </a:solidFill>
+                <a:latin typeface="Roboto" pitchFamily="2" charset="0"/>
+                <a:ea typeface="Roboto" pitchFamily="2" charset="0"/>
+              </a:rPr>
+              <a:t>February</a:t>
+            </a:r>
+            <a:r>
+              <a:rPr lang="de-DE" sz="2400" dirty="0" smtClean="0">
+                <a:solidFill>
+                  <a:schemeClr val="bg1">
+                    <a:lumMod val="50000"/>
+                  </a:schemeClr>
+                </a:solidFill>
+                <a:latin typeface="Roboto" pitchFamily="2" charset="0"/>
+                <a:ea typeface="Roboto" pitchFamily="2" charset="0"/>
+              </a:rPr>
+              <a:t> 2016</a:t>
             </a:r>
           </a:p>
           <a:p>

</xml_diff>